<commit_message>
Add LASSO visualization scripts and output files for improved analysis
</commit_message>
<xml_diff>
--- a/LassoSlides.pptx
+++ b/LassoSlides.pptx
@@ -4,11 +4,21 @@
   <p:sldMasterIdLst>
     <p:sldMasterId id="2147483648" r:id="rId1"/>
   </p:sldMasterIdLst>
+  <p:notesMasterIdLst>
+    <p:notesMasterId r:id="rId13"/>
+  </p:notesMasterIdLst>
   <p:sldIdLst>
     <p:sldId id="256" r:id="rId2"/>
     <p:sldId id="258" r:id="rId3"/>
     <p:sldId id="257" r:id="rId4"/>
     <p:sldId id="259" r:id="rId5"/>
+    <p:sldId id="260" r:id="rId6"/>
+    <p:sldId id="261" r:id="rId7"/>
+    <p:sldId id="262" r:id="rId8"/>
+    <p:sldId id="263" r:id="rId9"/>
+    <p:sldId id="264" r:id="rId10"/>
+    <p:sldId id="265" r:id="rId11"/>
+    <p:sldId id="266" r:id="rId12"/>
   </p:sldIdLst>
   <p:sldSz cx="12192000" cy="6858000"/>
   <p:notesSz cx="6858000" cy="9144000"/>
@@ -107,7 +117,445 @@
       </a:defRPr>
     </a:lvl9pPr>
   </p:defaultTextStyle>
+  <p:extLst>
+    <p:ext uri="{EFAFB233-063F-42B5-8137-9DF3F51BA10A}">
+      <p15:sldGuideLst xmlns:p15="http://schemas.microsoft.com/office/powerpoint/2012/main"/>
+    </p:ext>
+  </p:extLst>
 </p:presentation>
+</file>
+
+<file path=ppt/notesMasters/notesMaster1.xml><?xml version="1.0" encoding="utf-8"?>
+<p:notesMaster xmlns:a="http://schemas.openxmlformats.org/drawingml/2006/main" xmlns:r="http://schemas.openxmlformats.org/officeDocument/2006/relationships" xmlns:p="http://schemas.openxmlformats.org/presentationml/2006/main">
+  <p:cSld>
+    <p:bg>
+      <p:bgRef idx="1001">
+        <a:schemeClr val="bg1"/>
+      </p:bgRef>
+    </p:bg>
+    <p:spTree>
+      <p:nvGrpSpPr>
+        <p:cNvPr id="1" name=""/>
+        <p:cNvGrpSpPr/>
+        <p:nvPr/>
+      </p:nvGrpSpPr>
+      <p:grpSpPr>
+        <a:xfrm>
+          <a:off x="0" y="0"/>
+          <a:ext cx="0" cy="0"/>
+          <a:chOff x="0" y="0"/>
+          <a:chExt cx="0" cy="0"/>
+        </a:xfrm>
+      </p:grpSpPr>
+      <p:sp>
+        <p:nvSpPr>
+          <p:cNvPr id="2" name="頁首版面配置區 1"/>
+          <p:cNvSpPr>
+            <a:spLocks noGrp="1"/>
+          </p:cNvSpPr>
+          <p:nvPr>
+            <p:ph type="hdr" sz="quarter"/>
+          </p:nvPr>
+        </p:nvSpPr>
+        <p:spPr>
+          <a:xfrm>
+            <a:off x="0" y="0"/>
+            <a:ext cx="2971800" cy="458788"/>
+          </a:xfrm>
+          <a:prstGeom prst="rect">
+            <a:avLst/>
+          </a:prstGeom>
+        </p:spPr>
+        <p:txBody>
+          <a:bodyPr vert="horz" lIns="91440" tIns="45720" rIns="91440" bIns="45720" rtlCol="0"/>
+          <a:lstStyle>
+            <a:lvl1pPr algn="l">
+              <a:defRPr sz="1200"/>
+            </a:lvl1pPr>
+          </a:lstStyle>
+          <a:p>
+            <a:endParaRPr kumimoji="1" lang="zh-TW" altLang="en-US"/>
+          </a:p>
+        </p:txBody>
+      </p:sp>
+      <p:sp>
+        <p:nvSpPr>
+          <p:cNvPr id="3" name="日期版面配置區 2"/>
+          <p:cNvSpPr>
+            <a:spLocks noGrp="1"/>
+          </p:cNvSpPr>
+          <p:nvPr>
+            <p:ph type="dt" idx="1"/>
+          </p:nvPr>
+        </p:nvSpPr>
+        <p:spPr>
+          <a:xfrm>
+            <a:off x="3884613" y="0"/>
+            <a:ext cx="2971800" cy="458788"/>
+          </a:xfrm>
+          <a:prstGeom prst="rect">
+            <a:avLst/>
+          </a:prstGeom>
+        </p:spPr>
+        <p:txBody>
+          <a:bodyPr vert="horz" lIns="91440" tIns="45720" rIns="91440" bIns="45720" rtlCol="0"/>
+          <a:lstStyle>
+            <a:lvl1pPr algn="r">
+              <a:defRPr sz="1200"/>
+            </a:lvl1pPr>
+          </a:lstStyle>
+          <a:p>
+            <a:fld id="{6EA3BCF4-85B2-8641-8DB5-6E4135EF6E4C}" type="datetimeFigureOut">
+              <a:rPr kumimoji="1" lang="zh-TW" altLang="en-US" smtClean="0"/>
+              <a:t>2025/9/10</a:t>
+            </a:fld>
+            <a:endParaRPr kumimoji="1" lang="zh-TW" altLang="en-US"/>
+          </a:p>
+        </p:txBody>
+      </p:sp>
+      <p:sp>
+        <p:nvSpPr>
+          <p:cNvPr id="4" name="投影片影像版面配置區 3"/>
+          <p:cNvSpPr>
+            <a:spLocks noGrp="1" noRot="1" noChangeAspect="1"/>
+          </p:cNvSpPr>
+          <p:nvPr>
+            <p:ph type="sldImg" idx="2"/>
+          </p:nvPr>
+        </p:nvSpPr>
+        <p:spPr>
+          <a:xfrm>
+            <a:off x="685800" y="1143000"/>
+            <a:ext cx="5486400" cy="3086100"/>
+          </a:xfrm>
+          <a:prstGeom prst="rect">
+            <a:avLst/>
+          </a:prstGeom>
+          <a:noFill/>
+          <a:ln w="12700">
+            <a:solidFill>
+              <a:prstClr val="black"/>
+            </a:solidFill>
+          </a:ln>
+        </p:spPr>
+        <p:txBody>
+          <a:bodyPr vert="horz" lIns="91440" tIns="45720" rIns="91440" bIns="45720" rtlCol="0" anchor="ctr"/>
+          <a:lstStyle/>
+          <a:p>
+            <a:endParaRPr lang="zh-TW" altLang="en-US"/>
+          </a:p>
+        </p:txBody>
+      </p:sp>
+      <p:sp>
+        <p:nvSpPr>
+          <p:cNvPr id="5" name="備忘稿版面配置區 4"/>
+          <p:cNvSpPr>
+            <a:spLocks noGrp="1"/>
+          </p:cNvSpPr>
+          <p:nvPr>
+            <p:ph type="body" sz="quarter" idx="3"/>
+          </p:nvPr>
+        </p:nvSpPr>
+        <p:spPr>
+          <a:xfrm>
+            <a:off x="685800" y="4400550"/>
+            <a:ext cx="5486400" cy="3600450"/>
+          </a:xfrm>
+          <a:prstGeom prst="rect">
+            <a:avLst/>
+          </a:prstGeom>
+        </p:spPr>
+        <p:txBody>
+          <a:bodyPr vert="horz" lIns="91440" tIns="45720" rIns="91440" bIns="45720" rtlCol="0"/>
+          <a:lstStyle/>
+          <a:p>
+            <a:pPr lvl="0"/>
+            <a:r>
+              <a:rPr kumimoji="1" lang="zh-TW" altLang="en-US"/>
+              <a:t>按一下以編輯母片文字樣式</a:t>
+            </a:r>
+          </a:p>
+          <a:p>
+            <a:pPr lvl="1"/>
+            <a:r>
+              <a:rPr kumimoji="1" lang="zh-TW" altLang="en-US"/>
+              <a:t>第二層</a:t>
+            </a:r>
+          </a:p>
+          <a:p>
+            <a:pPr lvl="2"/>
+            <a:r>
+              <a:rPr kumimoji="1" lang="zh-TW" altLang="en-US"/>
+              <a:t>第三層</a:t>
+            </a:r>
+          </a:p>
+          <a:p>
+            <a:pPr lvl="3"/>
+            <a:r>
+              <a:rPr kumimoji="1" lang="zh-TW" altLang="en-US"/>
+              <a:t>第四層</a:t>
+            </a:r>
+          </a:p>
+          <a:p>
+            <a:pPr lvl="4"/>
+            <a:r>
+              <a:rPr kumimoji="1" lang="zh-TW" altLang="en-US"/>
+              <a:t>第五層</a:t>
+            </a:r>
+          </a:p>
+        </p:txBody>
+      </p:sp>
+      <p:sp>
+        <p:nvSpPr>
+          <p:cNvPr id="6" name="頁尾版面配置區 5"/>
+          <p:cNvSpPr>
+            <a:spLocks noGrp="1"/>
+          </p:cNvSpPr>
+          <p:nvPr>
+            <p:ph type="ftr" sz="quarter" idx="4"/>
+          </p:nvPr>
+        </p:nvSpPr>
+        <p:spPr>
+          <a:xfrm>
+            <a:off x="0" y="8685213"/>
+            <a:ext cx="2971800" cy="458787"/>
+          </a:xfrm>
+          <a:prstGeom prst="rect">
+            <a:avLst/>
+          </a:prstGeom>
+        </p:spPr>
+        <p:txBody>
+          <a:bodyPr vert="horz" lIns="91440" tIns="45720" rIns="91440" bIns="45720" rtlCol="0" anchor="b"/>
+          <a:lstStyle>
+            <a:lvl1pPr algn="l">
+              <a:defRPr sz="1200"/>
+            </a:lvl1pPr>
+          </a:lstStyle>
+          <a:p>
+            <a:endParaRPr kumimoji="1" lang="zh-TW" altLang="en-US"/>
+          </a:p>
+        </p:txBody>
+      </p:sp>
+      <p:sp>
+        <p:nvSpPr>
+          <p:cNvPr id="7" name="投影片編號版面配置區 6"/>
+          <p:cNvSpPr>
+            <a:spLocks noGrp="1"/>
+          </p:cNvSpPr>
+          <p:nvPr>
+            <p:ph type="sldNum" sz="quarter" idx="5"/>
+          </p:nvPr>
+        </p:nvSpPr>
+        <p:spPr>
+          <a:xfrm>
+            <a:off x="3884613" y="8685213"/>
+            <a:ext cx="2971800" cy="458787"/>
+          </a:xfrm>
+          <a:prstGeom prst="rect">
+            <a:avLst/>
+          </a:prstGeom>
+        </p:spPr>
+        <p:txBody>
+          <a:bodyPr vert="horz" lIns="91440" tIns="45720" rIns="91440" bIns="45720" rtlCol="0" anchor="b"/>
+          <a:lstStyle>
+            <a:lvl1pPr algn="r">
+              <a:defRPr sz="1200"/>
+            </a:lvl1pPr>
+          </a:lstStyle>
+          <a:p>
+            <a:fld id="{895ED579-4AC7-F74B-A274-73D93CC353D9}" type="slidenum">
+              <a:rPr kumimoji="1" lang="zh-TW" altLang="en-US" smtClean="0"/>
+              <a:t>‹#›</a:t>
+            </a:fld>
+            <a:endParaRPr kumimoji="1" lang="zh-TW" altLang="en-US"/>
+          </a:p>
+        </p:txBody>
+      </p:sp>
+    </p:spTree>
+    <p:extLst>
+      <p:ext uri="{BB962C8B-B14F-4D97-AF65-F5344CB8AC3E}">
+        <p14:creationId xmlns:p14="http://schemas.microsoft.com/office/powerpoint/2010/main" val="2286998635"/>
+      </p:ext>
+    </p:extLst>
+  </p:cSld>
+  <p:clrMap bg1="lt1" tx1="dk1" bg2="lt2" tx2="dk2" accent1="accent1" accent2="accent2" accent3="accent3" accent4="accent4" accent5="accent5" accent6="accent6" hlink="hlink" folHlink="folHlink"/>
+  <p:notesStyle>
+    <a:lvl1pPr marL="0" algn="l" defTabSz="914400" rtl="0" eaLnBrk="1" latinLnBrk="0" hangingPunct="1">
+      <a:defRPr sz="1200" kern="1200">
+        <a:solidFill>
+          <a:schemeClr val="tx1"/>
+        </a:solidFill>
+        <a:latin typeface="+mn-lt"/>
+        <a:ea typeface="+mn-ea"/>
+        <a:cs typeface="+mn-cs"/>
+      </a:defRPr>
+    </a:lvl1pPr>
+    <a:lvl2pPr marL="457200" algn="l" defTabSz="914400" rtl="0" eaLnBrk="1" latinLnBrk="0" hangingPunct="1">
+      <a:defRPr sz="1200" kern="1200">
+        <a:solidFill>
+          <a:schemeClr val="tx1"/>
+        </a:solidFill>
+        <a:latin typeface="+mn-lt"/>
+        <a:ea typeface="+mn-ea"/>
+        <a:cs typeface="+mn-cs"/>
+      </a:defRPr>
+    </a:lvl2pPr>
+    <a:lvl3pPr marL="914400" algn="l" defTabSz="914400" rtl="0" eaLnBrk="1" latinLnBrk="0" hangingPunct="1">
+      <a:defRPr sz="1200" kern="1200">
+        <a:solidFill>
+          <a:schemeClr val="tx1"/>
+        </a:solidFill>
+        <a:latin typeface="+mn-lt"/>
+        <a:ea typeface="+mn-ea"/>
+        <a:cs typeface="+mn-cs"/>
+      </a:defRPr>
+    </a:lvl3pPr>
+    <a:lvl4pPr marL="1371600" algn="l" defTabSz="914400" rtl="0" eaLnBrk="1" latinLnBrk="0" hangingPunct="1">
+      <a:defRPr sz="1200" kern="1200">
+        <a:solidFill>
+          <a:schemeClr val="tx1"/>
+        </a:solidFill>
+        <a:latin typeface="+mn-lt"/>
+        <a:ea typeface="+mn-ea"/>
+        <a:cs typeface="+mn-cs"/>
+      </a:defRPr>
+    </a:lvl4pPr>
+    <a:lvl5pPr marL="1828800" algn="l" defTabSz="914400" rtl="0" eaLnBrk="1" latinLnBrk="0" hangingPunct="1">
+      <a:defRPr sz="1200" kern="1200">
+        <a:solidFill>
+          <a:schemeClr val="tx1"/>
+        </a:solidFill>
+        <a:latin typeface="+mn-lt"/>
+        <a:ea typeface="+mn-ea"/>
+        <a:cs typeface="+mn-cs"/>
+      </a:defRPr>
+    </a:lvl5pPr>
+    <a:lvl6pPr marL="2286000" algn="l" defTabSz="914400" rtl="0" eaLnBrk="1" latinLnBrk="0" hangingPunct="1">
+      <a:defRPr sz="1200" kern="1200">
+        <a:solidFill>
+          <a:schemeClr val="tx1"/>
+        </a:solidFill>
+        <a:latin typeface="+mn-lt"/>
+        <a:ea typeface="+mn-ea"/>
+        <a:cs typeface="+mn-cs"/>
+      </a:defRPr>
+    </a:lvl6pPr>
+    <a:lvl7pPr marL="2743200" algn="l" defTabSz="914400" rtl="0" eaLnBrk="1" latinLnBrk="0" hangingPunct="1">
+      <a:defRPr sz="1200" kern="1200">
+        <a:solidFill>
+          <a:schemeClr val="tx1"/>
+        </a:solidFill>
+        <a:latin typeface="+mn-lt"/>
+        <a:ea typeface="+mn-ea"/>
+        <a:cs typeface="+mn-cs"/>
+      </a:defRPr>
+    </a:lvl7pPr>
+    <a:lvl8pPr marL="3200400" algn="l" defTabSz="914400" rtl="0" eaLnBrk="1" latinLnBrk="0" hangingPunct="1">
+      <a:defRPr sz="1200" kern="1200">
+        <a:solidFill>
+          <a:schemeClr val="tx1"/>
+        </a:solidFill>
+        <a:latin typeface="+mn-lt"/>
+        <a:ea typeface="+mn-ea"/>
+        <a:cs typeface="+mn-cs"/>
+      </a:defRPr>
+    </a:lvl8pPr>
+    <a:lvl9pPr marL="3657600" algn="l" defTabSz="914400" rtl="0" eaLnBrk="1" latinLnBrk="0" hangingPunct="1">
+      <a:defRPr sz="1200" kern="1200">
+        <a:solidFill>
+          <a:schemeClr val="tx1"/>
+        </a:solidFill>
+        <a:latin typeface="+mn-lt"/>
+        <a:ea typeface="+mn-ea"/>
+        <a:cs typeface="+mn-cs"/>
+      </a:defRPr>
+    </a:lvl9pPr>
+  </p:notesStyle>
+</p:notesMaster>
+</file>
+
+<file path=ppt/notesSlides/notesSlide1.xml><?xml version="1.0" encoding="utf-8"?>
+<p:notes xmlns:a="http://schemas.openxmlformats.org/drawingml/2006/main" xmlns:r="http://schemas.openxmlformats.org/officeDocument/2006/relationships" xmlns:p="http://schemas.openxmlformats.org/presentationml/2006/main">
+  <p:cSld>
+    <p:spTree>
+      <p:nvGrpSpPr>
+        <p:cNvPr id="1" name=""/>
+        <p:cNvGrpSpPr/>
+        <p:nvPr/>
+      </p:nvGrpSpPr>
+      <p:grpSpPr>
+        <a:xfrm>
+          <a:off x="0" y="0"/>
+          <a:ext cx="0" cy="0"/>
+          <a:chOff x="0" y="0"/>
+          <a:chExt cx="0" cy="0"/>
+        </a:xfrm>
+      </p:grpSpPr>
+      <p:sp>
+        <p:nvSpPr>
+          <p:cNvPr id="2" name="投影片影像版面配置區 1"/>
+          <p:cNvSpPr>
+            <a:spLocks noGrp="1" noRot="1" noChangeAspect="1"/>
+          </p:cNvSpPr>
+          <p:nvPr>
+            <p:ph type="sldImg"/>
+          </p:nvPr>
+        </p:nvSpPr>
+        <p:spPr/>
+      </p:sp>
+      <p:sp>
+        <p:nvSpPr>
+          <p:cNvPr id="3" name="備忘稿版面配置區 2"/>
+          <p:cNvSpPr>
+            <a:spLocks noGrp="1"/>
+          </p:cNvSpPr>
+          <p:nvPr>
+            <p:ph type="body" idx="1"/>
+          </p:nvPr>
+        </p:nvSpPr>
+        <p:spPr/>
+        <p:txBody>
+          <a:bodyPr/>
+          <a:lstStyle/>
+          <a:p>
+            <a:endParaRPr kumimoji="1" lang="zh-TW" altLang="en-US"/>
+          </a:p>
+        </p:txBody>
+      </p:sp>
+      <p:sp>
+        <p:nvSpPr>
+          <p:cNvPr id="4" name="投影片編號版面配置區 3"/>
+          <p:cNvSpPr>
+            <a:spLocks noGrp="1"/>
+          </p:cNvSpPr>
+          <p:nvPr>
+            <p:ph type="sldNum" sz="quarter" idx="5"/>
+          </p:nvPr>
+        </p:nvSpPr>
+        <p:spPr/>
+        <p:txBody>
+          <a:bodyPr/>
+          <a:lstStyle/>
+          <a:p>
+            <a:fld id="{895ED579-4AC7-F74B-A274-73D93CC353D9}" type="slidenum">
+              <a:rPr kumimoji="1" lang="zh-TW" altLang="en-US" smtClean="0"/>
+              <a:t>4</a:t>
+            </a:fld>
+            <a:endParaRPr kumimoji="1" lang="zh-TW" altLang="en-US"/>
+          </a:p>
+        </p:txBody>
+      </p:sp>
+    </p:spTree>
+    <p:extLst>
+      <p:ext uri="{BB962C8B-B14F-4D97-AF65-F5344CB8AC3E}">
+        <p14:creationId xmlns:p14="http://schemas.microsoft.com/office/powerpoint/2010/main" val="3532068118"/>
+      </p:ext>
+    </p:extLst>
+  </p:cSld>
+  <p:clrMapOvr>
+    <a:masterClrMapping/>
+  </p:clrMapOvr>
+</p:notes>
 </file>
 
 <file path=ppt/slideLayouts/slideLayout1.xml><?xml version="1.0" encoding="utf-8"?>
@@ -257,7 +705,7 @@
           <a:p>
             <a:fld id="{5EF86C72-9547-6444-9C10-F52029981BFD}" type="datetimeFigureOut">
               <a:rPr kumimoji="1" lang="zh-TW" altLang="en-US" smtClean="0"/>
-              <a:t>2025/9/3</a:t>
+              <a:t>2025/9/10</a:t>
             </a:fld>
             <a:endParaRPr kumimoji="1" lang="zh-TW" altLang="en-US"/>
           </a:p>
@@ -455,7 +903,7 @@
           <a:p>
             <a:fld id="{5EF86C72-9547-6444-9C10-F52029981BFD}" type="datetimeFigureOut">
               <a:rPr kumimoji="1" lang="zh-TW" altLang="en-US" smtClean="0"/>
-              <a:t>2025/9/3</a:t>
+              <a:t>2025/9/10</a:t>
             </a:fld>
             <a:endParaRPr kumimoji="1" lang="zh-TW" altLang="en-US"/>
           </a:p>
@@ -663,7 +1111,7 @@
           <a:p>
             <a:fld id="{5EF86C72-9547-6444-9C10-F52029981BFD}" type="datetimeFigureOut">
               <a:rPr kumimoji="1" lang="zh-TW" altLang="en-US" smtClean="0"/>
-              <a:t>2025/9/3</a:t>
+              <a:t>2025/9/10</a:t>
             </a:fld>
             <a:endParaRPr kumimoji="1" lang="zh-TW" altLang="en-US"/>
           </a:p>
@@ -861,7 +1309,7 @@
           <a:p>
             <a:fld id="{5EF86C72-9547-6444-9C10-F52029981BFD}" type="datetimeFigureOut">
               <a:rPr kumimoji="1" lang="zh-TW" altLang="en-US" smtClean="0"/>
-              <a:t>2025/9/3</a:t>
+              <a:t>2025/9/10</a:t>
             </a:fld>
             <a:endParaRPr kumimoji="1" lang="zh-TW" altLang="en-US"/>
           </a:p>
@@ -1136,7 +1584,7 @@
           <a:p>
             <a:fld id="{5EF86C72-9547-6444-9C10-F52029981BFD}" type="datetimeFigureOut">
               <a:rPr kumimoji="1" lang="zh-TW" altLang="en-US" smtClean="0"/>
-              <a:t>2025/9/3</a:t>
+              <a:t>2025/9/10</a:t>
             </a:fld>
             <a:endParaRPr kumimoji="1" lang="zh-TW" altLang="en-US"/>
           </a:p>
@@ -1401,7 +1849,7 @@
           <a:p>
             <a:fld id="{5EF86C72-9547-6444-9C10-F52029981BFD}" type="datetimeFigureOut">
               <a:rPr kumimoji="1" lang="zh-TW" altLang="en-US" smtClean="0"/>
-              <a:t>2025/9/3</a:t>
+              <a:t>2025/9/10</a:t>
             </a:fld>
             <a:endParaRPr kumimoji="1" lang="zh-TW" altLang="en-US"/>
           </a:p>
@@ -1813,7 +2261,7 @@
           <a:p>
             <a:fld id="{5EF86C72-9547-6444-9C10-F52029981BFD}" type="datetimeFigureOut">
               <a:rPr kumimoji="1" lang="zh-TW" altLang="en-US" smtClean="0"/>
-              <a:t>2025/9/3</a:t>
+              <a:t>2025/9/10</a:t>
             </a:fld>
             <a:endParaRPr kumimoji="1" lang="zh-TW" altLang="en-US"/>
           </a:p>
@@ -1954,7 +2402,7 @@
           <a:p>
             <a:fld id="{5EF86C72-9547-6444-9C10-F52029981BFD}" type="datetimeFigureOut">
               <a:rPr kumimoji="1" lang="zh-TW" altLang="en-US" smtClean="0"/>
-              <a:t>2025/9/3</a:t>
+              <a:t>2025/9/10</a:t>
             </a:fld>
             <a:endParaRPr kumimoji="1" lang="zh-TW" altLang="en-US"/>
           </a:p>
@@ -2067,7 +2515,7 @@
           <a:p>
             <a:fld id="{5EF86C72-9547-6444-9C10-F52029981BFD}" type="datetimeFigureOut">
               <a:rPr kumimoji="1" lang="zh-TW" altLang="en-US" smtClean="0"/>
-              <a:t>2025/9/3</a:t>
+              <a:t>2025/9/10</a:t>
             </a:fld>
             <a:endParaRPr kumimoji="1" lang="zh-TW" altLang="en-US"/>
           </a:p>
@@ -2378,7 +2826,7 @@
           <a:p>
             <a:fld id="{5EF86C72-9547-6444-9C10-F52029981BFD}" type="datetimeFigureOut">
               <a:rPr kumimoji="1" lang="zh-TW" altLang="en-US" smtClean="0"/>
-              <a:t>2025/9/3</a:t>
+              <a:t>2025/9/10</a:t>
             </a:fld>
             <a:endParaRPr kumimoji="1" lang="zh-TW" altLang="en-US"/>
           </a:p>
@@ -2666,7 +3114,7 @@
           <a:p>
             <a:fld id="{5EF86C72-9547-6444-9C10-F52029981BFD}" type="datetimeFigureOut">
               <a:rPr kumimoji="1" lang="zh-TW" altLang="en-US" smtClean="0"/>
-              <a:t>2025/9/3</a:t>
+              <a:t>2025/9/10</a:t>
             </a:fld>
             <a:endParaRPr kumimoji="1" lang="zh-TW" altLang="en-US"/>
           </a:p>
@@ -2907,7 +3355,7 @@
           <a:p>
             <a:fld id="{5EF86C72-9547-6444-9C10-F52029981BFD}" type="datetimeFigureOut">
               <a:rPr kumimoji="1" lang="zh-TW" altLang="en-US" smtClean="0"/>
-              <a:t>2025/9/3</a:t>
+              <a:t>2025/9/10</a:t>
             </a:fld>
             <a:endParaRPr kumimoji="1" lang="zh-TW" altLang="en-US"/>
           </a:p>
@@ -3404,6 +3852,207 @@
 </p:sld>
 </file>
 
+<file path=ppt/slides/slide10.xml><?xml version="1.0" encoding="utf-8"?>
+<p:sld xmlns:a="http://schemas.openxmlformats.org/drawingml/2006/main" xmlns:r="http://schemas.openxmlformats.org/officeDocument/2006/relationships" xmlns:p="http://schemas.openxmlformats.org/presentationml/2006/main">
+  <p:cSld>
+    <p:spTree>
+      <p:nvGrpSpPr>
+        <p:cNvPr id="1" name=""/>
+        <p:cNvGrpSpPr/>
+        <p:nvPr/>
+      </p:nvGrpSpPr>
+      <p:grpSpPr>
+        <a:xfrm>
+          <a:off x="0" y="0"/>
+          <a:ext cx="0" cy="0"/>
+          <a:chOff x="0" y="0"/>
+          <a:chExt cx="0" cy="0"/>
+        </a:xfrm>
+      </p:grpSpPr>
+      <p:sp>
+        <p:nvSpPr>
+          <p:cNvPr id="2" name="Title 1">
+            <a:extLst>
+              <a:ext uri="{FF2B5EF4-FFF2-40B4-BE49-F238E27FC236}">
+                <a16:creationId xmlns:a16="http://schemas.microsoft.com/office/drawing/2014/main" id="{AED2E944-B492-78D1-EE36-0E96772E79CE}"/>
+              </a:ext>
+            </a:extLst>
+          </p:cNvPr>
+          <p:cNvSpPr>
+            <a:spLocks noGrp="1"/>
+          </p:cNvSpPr>
+          <p:nvPr>
+            <p:ph type="title"/>
+          </p:nvPr>
+        </p:nvSpPr>
+        <p:spPr/>
+        <p:txBody>
+          <a:bodyPr/>
+          <a:lstStyle/>
+          <a:p>
+            <a:r>
+              <a:rPr lang="en-TW" dirty="0"/>
+              <a:t>適用場景(Lasso)</a:t>
+            </a:r>
+          </a:p>
+        </p:txBody>
+      </p:sp>
+      <p:sp>
+        <p:nvSpPr>
+          <p:cNvPr id="3" name="Content Placeholder 2">
+            <a:extLst>
+              <a:ext uri="{FF2B5EF4-FFF2-40B4-BE49-F238E27FC236}">
+                <a16:creationId xmlns:a16="http://schemas.microsoft.com/office/drawing/2014/main" id="{F0CD1860-A811-F2DE-2E9B-0922802E9DA4}"/>
+              </a:ext>
+            </a:extLst>
+          </p:cNvPr>
+          <p:cNvSpPr>
+            <a:spLocks noGrp="1"/>
+          </p:cNvSpPr>
+          <p:nvPr>
+            <p:ph idx="1"/>
+          </p:nvPr>
+        </p:nvSpPr>
+        <p:spPr/>
+        <p:txBody>
+          <a:bodyPr/>
+          <a:lstStyle/>
+          <a:p>
+            <a:r>
+              <a:rPr lang="en-US" dirty="0"/>
+              <a:t>S</a:t>
+            </a:r>
+            <a:r>
+              <a:rPr lang="en-TW" dirty="0"/>
+              <a:t>parse dataset</a:t>
+            </a:r>
+          </a:p>
+          <a:p>
+            <a:r>
+              <a:rPr lang="en-US" dirty="0"/>
+              <a:t>p &gt; n (</a:t>
+            </a:r>
+            <a:r>
+              <a:rPr lang="en-US" dirty="0" err="1"/>
+              <a:t>小樣本</a:t>
+            </a:r>
+            <a:r>
+              <a:rPr lang="en-US" dirty="0"/>
+              <a:t>）</a:t>
+            </a:r>
+          </a:p>
+          <a:p>
+            <a:r>
+              <a:rPr lang="en-TW" dirty="0"/>
+              <a:t>好解釋性</a:t>
+            </a:r>
+          </a:p>
+        </p:txBody>
+      </p:sp>
+    </p:spTree>
+    <p:extLst>
+      <p:ext uri="{BB962C8B-B14F-4D97-AF65-F5344CB8AC3E}">
+        <p14:creationId xmlns:p14="http://schemas.microsoft.com/office/powerpoint/2010/main" val="977543812"/>
+      </p:ext>
+    </p:extLst>
+  </p:cSld>
+  <p:clrMapOvr>
+    <a:masterClrMapping/>
+  </p:clrMapOvr>
+</p:sld>
+</file>
+
+<file path=ppt/slides/slide11.xml><?xml version="1.0" encoding="utf-8"?>
+<p:sld xmlns:a="http://schemas.openxmlformats.org/drawingml/2006/main" xmlns:r="http://schemas.openxmlformats.org/officeDocument/2006/relationships" xmlns:p="http://schemas.openxmlformats.org/presentationml/2006/main">
+  <p:cSld>
+    <p:spTree>
+      <p:nvGrpSpPr>
+        <p:cNvPr id="1" name=""/>
+        <p:cNvGrpSpPr/>
+        <p:nvPr/>
+      </p:nvGrpSpPr>
+      <p:grpSpPr>
+        <a:xfrm>
+          <a:off x="0" y="0"/>
+          <a:ext cx="0" cy="0"/>
+          <a:chOff x="0" y="0"/>
+          <a:chExt cx="0" cy="0"/>
+        </a:xfrm>
+      </p:grpSpPr>
+      <p:sp>
+        <p:nvSpPr>
+          <p:cNvPr id="2" name="Title 1">
+            <a:extLst>
+              <a:ext uri="{FF2B5EF4-FFF2-40B4-BE49-F238E27FC236}">
+                <a16:creationId xmlns:a16="http://schemas.microsoft.com/office/drawing/2014/main" id="{E716C105-2557-5B35-6F8F-33BA4C8CCDAF}"/>
+              </a:ext>
+            </a:extLst>
+          </p:cNvPr>
+          <p:cNvSpPr>
+            <a:spLocks noGrp="1"/>
+          </p:cNvSpPr>
+          <p:nvPr>
+            <p:ph type="title"/>
+          </p:nvPr>
+        </p:nvSpPr>
+        <p:spPr/>
+        <p:txBody>
+          <a:bodyPr/>
+          <a:lstStyle/>
+          <a:p>
+            <a:r>
+              <a:rPr lang="en-TW" dirty="0"/>
+              <a:t>不適用</a:t>
+            </a:r>
+          </a:p>
+        </p:txBody>
+      </p:sp>
+      <p:sp>
+        <p:nvSpPr>
+          <p:cNvPr id="3" name="Content Placeholder 2">
+            <a:extLst>
+              <a:ext uri="{FF2B5EF4-FFF2-40B4-BE49-F238E27FC236}">
+                <a16:creationId xmlns:a16="http://schemas.microsoft.com/office/drawing/2014/main" id="{0F607404-2EE6-F05E-01EE-E298B9F138A7}"/>
+              </a:ext>
+            </a:extLst>
+          </p:cNvPr>
+          <p:cNvSpPr>
+            <a:spLocks noGrp="1"/>
+          </p:cNvSpPr>
+          <p:nvPr>
+            <p:ph idx="1"/>
+          </p:nvPr>
+        </p:nvSpPr>
+        <p:spPr/>
+        <p:txBody>
+          <a:bodyPr/>
+          <a:lstStyle/>
+          <a:p>
+            <a:r>
+              <a:rPr lang="en-TW" dirty="0"/>
+              <a:t>特徵高相關性時，只會取一個</a:t>
+            </a:r>
+            <a:r>
+              <a:rPr lang="en-TW"/>
+              <a:t>，其他砍成0</a:t>
+            </a:r>
+            <a:endParaRPr lang="en-TW" dirty="0"/>
+          </a:p>
+        </p:txBody>
+      </p:sp>
+    </p:spTree>
+    <p:extLst>
+      <p:ext uri="{BB962C8B-B14F-4D97-AF65-F5344CB8AC3E}">
+        <p14:creationId xmlns:p14="http://schemas.microsoft.com/office/powerpoint/2010/main" val="4032738412"/>
+      </p:ext>
+    </p:extLst>
+  </p:cSld>
+  <p:clrMapOvr>
+    <a:masterClrMapping/>
+  </p:clrMapOvr>
+</p:sld>
+</file>
+
 <file path=ppt/slides/slide2.xml><?xml version="1.0" encoding="utf-8"?>
 <p:sld xmlns:a="http://schemas.openxmlformats.org/drawingml/2006/main" xmlns:r="http://schemas.openxmlformats.org/officeDocument/2006/relationships" xmlns:p="http://schemas.openxmlformats.org/presentationml/2006/main">
   <p:cSld>
@@ -3456,8 +4105,8 @@
           </a:p>
         </p:txBody>
       </p:sp>
-      <mc:AlternateContent xmlns:mc="http://schemas.openxmlformats.org/markup-compatibility/2006">
-        <mc:Choice xmlns:a14="http://schemas.microsoft.com/office/drawing/2010/main" Requires="a14">
+      <mc:AlternateContent xmlns:mc="http://schemas.openxmlformats.org/markup-compatibility/2006" xmlns:a14="http://schemas.microsoft.com/office/drawing/2010/main">
+        <mc:Choice Requires="a14">
           <p:sp>
             <p:nvSpPr>
               <p:cNvPr id="3" name="內容版面配置區 2">
@@ -4065,12 +4714,11 @@
                   <a:rPr lang="en" altLang="zh-TW" dirty="0"/>
                   <a:t>Difference in probability distributions, suitable for classification</a:t>
                 </a:r>
-                <a14:m/>
               </a:p>
             </p:txBody>
           </p:sp>
         </mc:Choice>
-        <mc:Fallback>
+        <mc:Fallback xmlns="">
           <p:sp>
             <p:nvSpPr>
               <p:cNvPr id="3" name="內容版面配置區 2">
@@ -4175,8 +4823,8 @@
           </a:p>
         </p:txBody>
       </p:sp>
-      <mc:AlternateContent xmlns:mc="http://schemas.openxmlformats.org/markup-compatibility/2006">
-        <mc:Choice xmlns:a14="http://schemas.microsoft.com/office/drawing/2010/main" Requires="a14">
+      <mc:AlternateContent xmlns:mc="http://schemas.openxmlformats.org/markup-compatibility/2006" xmlns:a14="http://schemas.microsoft.com/office/drawing/2010/main">
+        <mc:Choice Requires="a14">
           <p:sp>
             <p:nvSpPr>
               <p:cNvPr id="3" name="內容版面配置區 2">
@@ -4656,6 +5304,10 @@
                     </m:nary>
                   </m:oMath>
                 </a14:m>
+                <a:endParaRPr kumimoji="1" lang="en-US" altLang="zh-TW" i="1" dirty="0">
+                  <a:latin typeface="Cambria Math" panose="02040503050406030204" pitchFamily="18" charset="0"/>
+                  <a:cs typeface="Calibri" panose="020F0502020204030204" pitchFamily="34" charset="0"/>
+                </a:endParaRPr>
               </a:p>
               <a:p>
                 <a:pPr marL="0" indent="0">
@@ -5104,14 +5756,22 @@
                     </m:nary>
                   </m:oMath>
                 </a14:m>
+                <a:endParaRPr kumimoji="1" lang="en-US" altLang="zh-TW" i="1" dirty="0">
+                  <a:latin typeface="Cambria Math" panose="02040503050406030204" pitchFamily="18" charset="0"/>
+                  <a:cs typeface="Calibri" panose="020F0502020204030204" pitchFamily="34" charset="0"/>
+                </a:endParaRPr>
               </a:p>
               <a:p>
                 <a:pPr lvl="1"/>
+                <a:endParaRPr kumimoji="1" lang="en-US" altLang="zh-TW" i="1" dirty="0">
+                  <a:latin typeface="Cambria Math" panose="02040503050406030204" pitchFamily="18" charset="0"/>
+                  <a:cs typeface="Calibri" panose="020F0502020204030204" pitchFamily="34" charset="0"/>
+                </a:endParaRPr>
               </a:p>
             </p:txBody>
           </p:sp>
         </mc:Choice>
-        <mc:Fallback>
+        <mc:Fallback xmlns="">
           <p:sp>
             <p:nvSpPr>
               <p:cNvPr id="3" name="內容版面配置區 2">
@@ -5213,7 +5873,7 @@
                 <a:latin typeface="Calibri" panose="020F0502020204030204" pitchFamily="34" charset="0"/>
                 <a:cs typeface="Calibri" panose="020F0502020204030204" pitchFamily="34" charset="0"/>
               </a:rPr>
-              <a:t>Lasso </a:t>
+              <a:t>Lasso</a:t>
             </a:r>
             <a:endParaRPr kumimoji="1" lang="zh-TW" altLang="en-US" dirty="0">
               <a:latin typeface="Calibri" panose="020F0502020204030204" pitchFamily="34" charset="0"/>
@@ -5524,11 +6184,14 @@
                                 </m:sSubPr>
                                 <m:e>
                                   <m:r>
-                                    <a:rPr kumimoji="1" lang="en-US" altLang="zh-TW" sz="6700" i="1" dirty="0" err="1" smtClean="0">
+                                    <m:rPr>
+                                      <m:sty m:val="p"/>
+                                    </m:rPr>
+                                    <a:rPr kumimoji="1" lang="en-US" altLang="zh-TW" sz="6700" b="0" i="1" dirty="0" smtClean="0">
                                       <a:latin typeface="Cambria Math" panose="02040503050406030204" pitchFamily="18" charset="0"/>
                                       <a:cs typeface="Calibri" panose="020F0502020204030204" pitchFamily="34" charset="0"/>
                                     </a:rPr>
-                                    <m:t>𝑤</m:t>
+                                    <m:t>β</m:t>
                                   </m:r>
                                 </m:e>
                                 <m:sub>
@@ -5579,9 +6242,380 @@
                 <a:ext cx="5180190" cy="2348089"/>
               </a:xfrm>
               <a:blipFill>
-                <a:blip r:embed="rId2"/>
+                <a:blip r:embed="rId3"/>
                 <a:stretch>
                   <a:fillRect l="-10024" t="-20430" b="-76344"/>
+                </a:stretch>
+              </a:blipFill>
+            </p:spPr>
+            <p:txBody>
+              <a:bodyPr/>
+              <a:lstStyle/>
+              <a:p>
+                <a:r>
+                  <a:rPr lang="en-TW">
+                    <a:noFill/>
+                  </a:rPr>
+                  <a:t> </a:t>
+                </a:r>
+              </a:p>
+            </p:txBody>
+          </p:sp>
+        </mc:Fallback>
+      </mc:AlternateContent>
+      <p:sp>
+        <p:nvSpPr>
+          <p:cNvPr id="7" name="橢圓 6">
+            <a:extLst>
+              <a:ext uri="{FF2B5EF4-FFF2-40B4-BE49-F238E27FC236}">
+                <a16:creationId xmlns:a16="http://schemas.microsoft.com/office/drawing/2014/main" id="{FA02481B-7D11-1E1C-0F21-2FBD80C594BB}"/>
+              </a:ext>
+            </a:extLst>
+          </p:cNvPr>
+          <p:cNvSpPr/>
+          <p:nvPr/>
+        </p:nvSpPr>
+        <p:spPr>
+          <a:xfrm>
+            <a:off x="8918368" y="784461"/>
+            <a:ext cx="593766" cy="486889"/>
+          </a:xfrm>
+          <a:prstGeom prst="ellipse">
+            <a:avLst/>
+          </a:prstGeom>
+          <a:noFill/>
+        </p:spPr>
+        <p:style>
+          <a:lnRef idx="2">
+            <a:schemeClr val="accent2"/>
+          </a:lnRef>
+          <a:fillRef idx="1">
+            <a:schemeClr val="lt1"/>
+          </a:fillRef>
+          <a:effectRef idx="0">
+            <a:schemeClr val="accent2"/>
+          </a:effectRef>
+          <a:fontRef idx="minor">
+            <a:schemeClr val="dk1"/>
+          </a:fontRef>
+        </p:style>
+        <p:txBody>
+          <a:bodyPr rtlCol="0" anchor="ctr"/>
+          <a:lstStyle/>
+          <a:p>
+            <a:pPr algn="ctr"/>
+            <a:endParaRPr kumimoji="1" lang="zh-TW" altLang="en-US">
+              <a:ln>
+                <a:solidFill>
+                  <a:sysClr val="windowText" lastClr="000000"/>
+                </a:solidFill>
+              </a:ln>
+              <a:solidFill>
+                <a:schemeClr val="tx1"/>
+              </a:solidFill>
+            </a:endParaRPr>
+          </a:p>
+        </p:txBody>
+      </p:sp>
+      <p:cxnSp>
+        <p:nvCxnSpPr>
+          <p:cNvPr id="9" name="直線箭頭接點 8">
+            <a:extLst>
+              <a:ext uri="{FF2B5EF4-FFF2-40B4-BE49-F238E27FC236}">
+                <a16:creationId xmlns:a16="http://schemas.microsoft.com/office/drawing/2014/main" id="{9DDF1E1C-EA03-E016-FEDE-2902C6C94FB9}"/>
+              </a:ext>
+            </a:extLst>
+          </p:cNvPr>
+          <p:cNvCxnSpPr>
+            <a:stCxn id="7" idx="3"/>
+          </p:cNvCxnSpPr>
+          <p:nvPr/>
+        </p:nvCxnSpPr>
+        <p:spPr>
+          <a:xfrm flipH="1">
+            <a:off x="4013860" y="1200047"/>
+            <a:ext cx="4991463" cy="925636"/>
+          </a:xfrm>
+          <a:prstGeom prst="straightConnector1">
+            <a:avLst/>
+          </a:prstGeom>
+          <a:ln>
+            <a:tailEnd type="triangle"/>
+          </a:ln>
+        </p:spPr>
+        <p:style>
+          <a:lnRef idx="3">
+            <a:schemeClr val="accent2"/>
+          </a:lnRef>
+          <a:fillRef idx="0">
+            <a:schemeClr val="accent2"/>
+          </a:fillRef>
+          <a:effectRef idx="2">
+            <a:schemeClr val="accent2"/>
+          </a:effectRef>
+          <a:fontRef idx="minor">
+            <a:schemeClr val="tx1"/>
+          </a:fontRef>
+        </p:style>
+      </p:cxnSp>
+      <mc:AlternateContent xmlns:mc="http://schemas.openxmlformats.org/markup-compatibility/2006" xmlns:a14="http://schemas.microsoft.com/office/drawing/2010/main">
+        <mc:Choice Requires="a14">
+          <p:sp>
+            <p:nvSpPr>
+              <p:cNvPr id="10" name="文字方塊 9">
+                <a:extLst>
+                  <a:ext uri="{FF2B5EF4-FFF2-40B4-BE49-F238E27FC236}">
+                    <a16:creationId xmlns:a16="http://schemas.microsoft.com/office/drawing/2014/main" id="{A0A5DEAA-1EDD-F848-EF76-675EC27155E6}"/>
+                  </a:ext>
+                </a:extLst>
+              </p:cNvPr>
+              <p:cNvSpPr txBox="1"/>
+              <p:nvPr/>
+            </p:nvSpPr>
+            <p:spPr>
+              <a:xfrm>
+                <a:off x="629392" y="2094398"/>
+                <a:ext cx="3906982" cy="471539"/>
+              </a:xfrm>
+              <a:prstGeom prst="rect">
+                <a:avLst/>
+              </a:prstGeom>
+              <a:noFill/>
+            </p:spPr>
+            <p:txBody>
+              <a:bodyPr wrap="square" rtlCol="0">
+                <a:spAutoFit/>
+              </a:bodyPr>
+              <a:lstStyle/>
+              <a:p>
+                <a:pPr/>
+                <a14:m>
+                  <m:oMathPara xmlns:m="http://schemas.openxmlformats.org/officeDocument/2006/math">
+                    <m:oMathParaPr>
+                      <m:jc m:val="centerGroup"/>
+                    </m:oMathParaPr>
+                    <m:oMath xmlns:m="http://schemas.openxmlformats.org/officeDocument/2006/math">
+                      <m:acc>
+                        <m:accPr>
+                          <m:chr m:val="̂"/>
+                          <m:ctrlPr>
+                            <a:rPr kumimoji="1" lang="en-US" altLang="zh-TW" sz="2400" i="1" dirty="0" smtClean="0">
+                              <a:latin typeface="Cambria Math" panose="02040503050406030204" pitchFamily="18" charset="0"/>
+                            </a:rPr>
+                          </m:ctrlPr>
+                        </m:accPr>
+                        <m:e>
+                          <m:r>
+                            <a:rPr kumimoji="1" lang="en-US" altLang="zh-TW" sz="2400" i="1" dirty="0" smtClean="0">
+                              <a:latin typeface="Cambria Math" panose="02040503050406030204" pitchFamily="18" charset="0"/>
+                            </a:rPr>
+                            <m:t>𝑌</m:t>
+                          </m:r>
+                        </m:e>
+                      </m:acc>
+                      <m:r>
+                        <a:rPr kumimoji="1" lang="en-US" altLang="zh-TW" sz="2400" i="1" dirty="0" smtClean="0">
+                          <a:latin typeface="Cambria Math" panose="02040503050406030204" pitchFamily="18" charset="0"/>
+                        </a:rPr>
+                        <m:t>=</m:t>
+                      </m:r>
+                      <m:sSub>
+                        <m:sSubPr>
+                          <m:ctrlPr>
+                            <a:rPr kumimoji="1" lang="en-US" altLang="zh-TW" sz="2400" i="1" dirty="0" smtClean="0">
+                              <a:latin typeface="Cambria Math" panose="02040503050406030204" pitchFamily="18" charset="0"/>
+                            </a:rPr>
+                          </m:ctrlPr>
+                        </m:sSubPr>
+                        <m:e>
+                          <m:r>
+                            <a:rPr kumimoji="1" lang="en-US" altLang="zh-TW" sz="2400" i="1" dirty="0" smtClean="0">
+                              <a:latin typeface="Cambria Math" panose="02040503050406030204" pitchFamily="18" charset="0"/>
+                            </a:rPr>
+                            <m:t>𝛽</m:t>
+                          </m:r>
+                        </m:e>
+                        <m:sub>
+                          <m:r>
+                            <a:rPr kumimoji="1" lang="en-US" altLang="zh-TW" sz="2400" i="1" dirty="0" smtClean="0">
+                              <a:latin typeface="Cambria Math" panose="02040503050406030204" pitchFamily="18" charset="0"/>
+                            </a:rPr>
+                            <m:t>1</m:t>
+                          </m:r>
+                        </m:sub>
+                      </m:sSub>
+                      <m:sSub>
+                        <m:sSubPr>
+                          <m:ctrlPr>
+                            <a:rPr kumimoji="1" lang="en-US" altLang="zh-TW" sz="2400" i="1" dirty="0" smtClean="0">
+                              <a:latin typeface="Cambria Math" panose="02040503050406030204" pitchFamily="18" charset="0"/>
+                            </a:rPr>
+                          </m:ctrlPr>
+                        </m:sSubPr>
+                        <m:e>
+                          <m:r>
+                            <a:rPr kumimoji="1" lang="en-US" altLang="zh-TW" sz="2400" i="1" dirty="0" smtClean="0">
+                              <a:latin typeface="Cambria Math" panose="02040503050406030204" pitchFamily="18" charset="0"/>
+                            </a:rPr>
+                            <m:t>𝑥</m:t>
+                          </m:r>
+                        </m:e>
+                        <m:sub>
+                          <m:r>
+                            <a:rPr kumimoji="1" lang="en-US" altLang="zh-TW" sz="2400" i="1" dirty="0" smtClean="0">
+                              <a:latin typeface="Cambria Math" panose="02040503050406030204" pitchFamily="18" charset="0"/>
+                            </a:rPr>
+                            <m:t>1</m:t>
+                          </m:r>
+                        </m:sub>
+                      </m:sSub>
+                      <m:r>
+                        <a:rPr kumimoji="1" lang="en-US" altLang="zh-TW" sz="2400" i="1" dirty="0" smtClean="0">
+                          <a:latin typeface="Cambria Math" panose="02040503050406030204" pitchFamily="18" charset="0"/>
+                        </a:rPr>
+                        <m:t>+</m:t>
+                      </m:r>
+                      <m:sSub>
+                        <m:sSubPr>
+                          <m:ctrlPr>
+                            <a:rPr kumimoji="1" lang="en-US" altLang="zh-TW" sz="2400" i="1" dirty="0" smtClean="0">
+                              <a:latin typeface="Cambria Math" panose="02040503050406030204" pitchFamily="18" charset="0"/>
+                            </a:rPr>
+                          </m:ctrlPr>
+                        </m:sSubPr>
+                        <m:e>
+                          <m:r>
+                            <a:rPr kumimoji="1" lang="en-US" altLang="zh-TW" sz="2400" i="1" dirty="0" smtClean="0">
+                              <a:latin typeface="Cambria Math" panose="02040503050406030204" pitchFamily="18" charset="0"/>
+                            </a:rPr>
+                            <m:t>𝛽</m:t>
+                          </m:r>
+                        </m:e>
+                        <m:sub>
+                          <m:r>
+                            <a:rPr kumimoji="1" lang="en-US" altLang="zh-TW" sz="2400" i="1" dirty="0" smtClean="0">
+                              <a:latin typeface="Cambria Math" panose="02040503050406030204" pitchFamily="18" charset="0"/>
+                            </a:rPr>
+                            <m:t>2</m:t>
+                          </m:r>
+                        </m:sub>
+                      </m:sSub>
+                      <m:sSub>
+                        <m:sSubPr>
+                          <m:ctrlPr>
+                            <a:rPr kumimoji="1" lang="en-US" altLang="zh-TW" sz="2400" i="1" dirty="0" smtClean="0">
+                              <a:latin typeface="Cambria Math" panose="02040503050406030204" pitchFamily="18" charset="0"/>
+                            </a:rPr>
+                          </m:ctrlPr>
+                        </m:sSubPr>
+                        <m:e>
+                          <m:r>
+                            <a:rPr kumimoji="1" lang="en-US" altLang="zh-TW" sz="2400" i="1" dirty="0" smtClean="0">
+                              <a:latin typeface="Cambria Math" panose="02040503050406030204" pitchFamily="18" charset="0"/>
+                            </a:rPr>
+                            <m:t>𝑥</m:t>
+                          </m:r>
+                        </m:e>
+                        <m:sub>
+                          <m:r>
+                            <a:rPr kumimoji="1" lang="en-US" altLang="zh-TW" sz="2400" i="1" dirty="0" smtClean="0">
+                              <a:latin typeface="Cambria Math" panose="02040503050406030204" pitchFamily="18" charset="0"/>
+                            </a:rPr>
+                            <m:t>2</m:t>
+                          </m:r>
+                        </m:sub>
+                      </m:sSub>
+                      <m:r>
+                        <a:rPr kumimoji="1" lang="en-US" altLang="zh-TW" sz="2400" i="1" dirty="0" smtClean="0">
+                          <a:latin typeface="Cambria Math" panose="02040503050406030204" pitchFamily="18" charset="0"/>
+                        </a:rPr>
+                        <m:t>+</m:t>
+                      </m:r>
+                      <m:sSub>
+                        <m:sSubPr>
+                          <m:ctrlPr>
+                            <a:rPr kumimoji="1" lang="en-US" altLang="zh-TW" sz="2400" i="1" dirty="0" smtClean="0">
+                              <a:latin typeface="Cambria Math" panose="02040503050406030204" pitchFamily="18" charset="0"/>
+                            </a:rPr>
+                          </m:ctrlPr>
+                        </m:sSubPr>
+                        <m:e>
+                          <m:r>
+                            <a:rPr kumimoji="1" lang="en-US" altLang="zh-TW" sz="2400" i="1" dirty="0" smtClean="0">
+                              <a:latin typeface="Cambria Math" panose="02040503050406030204" pitchFamily="18" charset="0"/>
+                            </a:rPr>
+                            <m:t>𝛽</m:t>
+                          </m:r>
+                        </m:e>
+                        <m:sub>
+                          <m:r>
+                            <a:rPr kumimoji="1" lang="en-US" altLang="zh-TW" sz="2400" i="1" dirty="0" smtClean="0">
+                              <a:latin typeface="Cambria Math" panose="02040503050406030204" pitchFamily="18" charset="0"/>
+                            </a:rPr>
+                            <m:t>3</m:t>
+                          </m:r>
+                        </m:sub>
+                      </m:sSub>
+                      <m:sSub>
+                        <m:sSubPr>
+                          <m:ctrlPr>
+                            <a:rPr kumimoji="1" lang="en-US" altLang="zh-TW" sz="2400" i="1" dirty="0" smtClean="0">
+                              <a:latin typeface="Cambria Math" panose="02040503050406030204" pitchFamily="18" charset="0"/>
+                            </a:rPr>
+                          </m:ctrlPr>
+                        </m:sSubPr>
+                        <m:e>
+                          <m:r>
+                            <a:rPr kumimoji="1" lang="en-US" altLang="zh-TW" sz="2400" i="1" dirty="0" smtClean="0">
+                              <a:latin typeface="Cambria Math" panose="02040503050406030204" pitchFamily="18" charset="0"/>
+                            </a:rPr>
+                            <m:t>𝑥</m:t>
+                          </m:r>
+                        </m:e>
+                        <m:sub>
+                          <m:r>
+                            <a:rPr kumimoji="1" lang="en-US" altLang="zh-TW" sz="2400" i="1" dirty="0" smtClean="0">
+                              <a:latin typeface="Cambria Math" panose="02040503050406030204" pitchFamily="18" charset="0"/>
+                            </a:rPr>
+                            <m:t>3</m:t>
+                          </m:r>
+                        </m:sub>
+                      </m:sSub>
+                    </m:oMath>
+                  </m:oMathPara>
+                </a14:m>
+                <a:endParaRPr dirty="0"/>
+              </a:p>
+            </p:txBody>
+          </p:sp>
+        </mc:Choice>
+        <mc:Fallback xmlns="">
+          <p:sp>
+            <p:nvSpPr>
+              <p:cNvPr id="10" name="文字方塊 9">
+                <a:extLst>
+                  <a:ext uri="{FF2B5EF4-FFF2-40B4-BE49-F238E27FC236}">
+                    <a16:creationId xmlns:a16="http://schemas.microsoft.com/office/drawing/2014/main" id="{A0A5DEAA-1EDD-F848-EF76-675EC27155E6}"/>
+                  </a:ext>
+                </a:extLst>
+              </p:cNvPr>
+              <p:cNvSpPr txBox="1">
+                <a:spLocks noRot="1" noChangeAspect="1" noMove="1" noResize="1" noEditPoints="1" noAdjustHandles="1" noChangeArrowheads="1" noChangeShapeType="1" noTextEdit="1"/>
+              </p:cNvSpPr>
+              <p:nvPr/>
+            </p:nvSpPr>
+            <p:spPr>
+              <a:xfrm>
+                <a:off x="629392" y="2094398"/>
+                <a:ext cx="3906982" cy="471539"/>
+              </a:xfrm>
+              <a:prstGeom prst="rect">
+                <a:avLst/>
+              </a:prstGeom>
+              <a:blipFill>
+                <a:blip r:embed="rId4"/>
+                <a:stretch>
+                  <a:fillRect t="-13158" b="-26316"/>
                 </a:stretch>
               </a:blipFill>
             </p:spPr>
@@ -5600,10 +6634,646 @@
           </p:sp>
         </mc:Fallback>
       </mc:AlternateContent>
+      <p:pic>
+        <p:nvPicPr>
+          <p:cNvPr id="4" name="Picture 3">
+            <a:extLst>
+              <a:ext uri="{FF2B5EF4-FFF2-40B4-BE49-F238E27FC236}">
+                <a16:creationId xmlns:a16="http://schemas.microsoft.com/office/drawing/2014/main" id="{CC2E9790-F67B-8CC0-4883-BE71F4260394}"/>
+              </a:ext>
+            </a:extLst>
+          </p:cNvPr>
+          <p:cNvPicPr>
+            <a:picLocks noChangeAspect="1"/>
+          </p:cNvPicPr>
+          <p:nvPr/>
+        </p:nvPicPr>
+        <p:blipFill>
+          <a:blip r:embed="rId5"/>
+          <a:stretch>
+            <a:fillRect/>
+          </a:stretch>
+        </p:blipFill>
+        <p:spPr>
+          <a:xfrm>
+            <a:off x="629392" y="3276273"/>
+            <a:ext cx="10531314" cy="1636404"/>
+          </a:xfrm>
+          <a:prstGeom prst="rect">
+            <a:avLst/>
+          </a:prstGeom>
+        </p:spPr>
+      </p:pic>
     </p:spTree>
     <p:extLst>
       <p:ext uri="{BB962C8B-B14F-4D97-AF65-F5344CB8AC3E}">
         <p14:creationId xmlns:p14="http://schemas.microsoft.com/office/powerpoint/2010/main" val="526265296"/>
+      </p:ext>
+    </p:extLst>
+  </p:cSld>
+  <p:clrMapOvr>
+    <a:masterClrMapping/>
+  </p:clrMapOvr>
+</p:sld>
+</file>
+
+<file path=ppt/slides/slide5.xml><?xml version="1.0" encoding="utf-8"?>
+<p:sld xmlns:a="http://schemas.openxmlformats.org/drawingml/2006/main" xmlns:r="http://schemas.openxmlformats.org/officeDocument/2006/relationships" xmlns:p="http://schemas.openxmlformats.org/presentationml/2006/main">
+  <p:cSld>
+    <p:spTree>
+      <p:nvGrpSpPr>
+        <p:cNvPr id="1" name=""/>
+        <p:cNvGrpSpPr/>
+        <p:nvPr/>
+      </p:nvGrpSpPr>
+      <p:grpSpPr>
+        <a:xfrm>
+          <a:off x="0" y="0"/>
+          <a:ext cx="0" cy="0"/>
+          <a:chOff x="0" y="0"/>
+          <a:chExt cx="0" cy="0"/>
+        </a:xfrm>
+      </p:grpSpPr>
+      <p:sp>
+        <p:nvSpPr>
+          <p:cNvPr id="2" name="Title 1">
+            <a:extLst>
+              <a:ext uri="{FF2B5EF4-FFF2-40B4-BE49-F238E27FC236}">
+                <a16:creationId xmlns:a16="http://schemas.microsoft.com/office/drawing/2014/main" id="{1EEDCE68-0EB1-0DF3-E1E9-D16C11F5893C}"/>
+              </a:ext>
+            </a:extLst>
+          </p:cNvPr>
+          <p:cNvSpPr>
+            <a:spLocks noGrp="1"/>
+          </p:cNvSpPr>
+          <p:nvPr>
+            <p:ph type="title"/>
+          </p:nvPr>
+        </p:nvSpPr>
+        <p:spPr/>
+        <p:txBody>
+          <a:bodyPr/>
+          <a:lstStyle/>
+          <a:p>
+            <a:r>
+              <a:rPr lang="en-US" dirty="0"/>
+              <a:t>O</a:t>
+            </a:r>
+            <a:r>
+              <a:rPr lang="en-TW" dirty="0"/>
+              <a:t>ne dimensional supproblem</a:t>
+            </a:r>
+            <a:br>
+              <a:rPr lang="en-TW" dirty="0"/>
+            </a:br>
+            <a:r>
+              <a:rPr lang="en-TW" dirty="0"/>
+              <a:t>(coordinate descent)</a:t>
+            </a:r>
+          </a:p>
+        </p:txBody>
+      </p:sp>
+      <p:pic>
+        <p:nvPicPr>
+          <p:cNvPr id="4" name="Content Placeholder 3">
+            <a:extLst>
+              <a:ext uri="{FF2B5EF4-FFF2-40B4-BE49-F238E27FC236}">
+                <a16:creationId xmlns:a16="http://schemas.microsoft.com/office/drawing/2014/main" id="{AD9C5D02-6149-056C-4C6C-B67DCB95BA54}"/>
+              </a:ext>
+            </a:extLst>
+          </p:cNvPr>
+          <p:cNvPicPr>
+            <a:picLocks noGrp="1" noChangeAspect="1"/>
+          </p:cNvPicPr>
+          <p:nvPr>
+            <p:ph idx="1"/>
+          </p:nvPr>
+        </p:nvPicPr>
+        <p:blipFill>
+          <a:blip r:embed="rId2"/>
+          <a:stretch>
+            <a:fillRect/>
+          </a:stretch>
+        </p:blipFill>
+        <p:spPr>
+          <a:xfrm>
+            <a:off x="1338107" y="2850532"/>
+            <a:ext cx="9515785" cy="1439245"/>
+          </a:xfrm>
+          <a:prstGeom prst="rect">
+            <a:avLst/>
+          </a:prstGeom>
+        </p:spPr>
+      </p:pic>
+    </p:spTree>
+    <p:extLst>
+      <p:ext uri="{BB962C8B-B14F-4D97-AF65-F5344CB8AC3E}">
+        <p14:creationId xmlns:p14="http://schemas.microsoft.com/office/powerpoint/2010/main" val="287162412"/>
+      </p:ext>
+    </p:extLst>
+  </p:cSld>
+  <p:clrMapOvr>
+    <a:masterClrMapping/>
+  </p:clrMapOvr>
+</p:sld>
+</file>
+
+<file path=ppt/slides/slide6.xml><?xml version="1.0" encoding="utf-8"?>
+<p:sld xmlns:a="http://schemas.openxmlformats.org/drawingml/2006/main" xmlns:r="http://schemas.openxmlformats.org/officeDocument/2006/relationships" xmlns:p="http://schemas.openxmlformats.org/presentationml/2006/main">
+  <p:cSld>
+    <p:spTree>
+      <p:nvGrpSpPr>
+        <p:cNvPr id="1" name="">
+          <a:extLst>
+            <a:ext uri="{FF2B5EF4-FFF2-40B4-BE49-F238E27FC236}">
+              <a16:creationId xmlns:a16="http://schemas.microsoft.com/office/drawing/2014/main" id="{F593CCDA-72BA-8E7C-7919-1351D43A2934}"/>
+            </a:ext>
+          </a:extLst>
+        </p:cNvPr>
+        <p:cNvGrpSpPr/>
+        <p:nvPr/>
+      </p:nvGrpSpPr>
+      <p:grpSpPr>
+        <a:xfrm>
+          <a:off x="0" y="0"/>
+          <a:ext cx="0" cy="0"/>
+          <a:chOff x="0" y="0"/>
+          <a:chExt cx="0" cy="0"/>
+        </a:xfrm>
+      </p:grpSpPr>
+      <p:sp>
+        <p:nvSpPr>
+          <p:cNvPr id="2" name="Title 1">
+            <a:extLst>
+              <a:ext uri="{FF2B5EF4-FFF2-40B4-BE49-F238E27FC236}">
+                <a16:creationId xmlns:a16="http://schemas.microsoft.com/office/drawing/2014/main" id="{93DBCC42-F7D9-C052-0152-D1800BCFC665}"/>
+              </a:ext>
+            </a:extLst>
+          </p:cNvPr>
+          <p:cNvSpPr>
+            <a:spLocks noGrp="1"/>
+          </p:cNvSpPr>
+          <p:nvPr>
+            <p:ph type="title"/>
+          </p:nvPr>
+        </p:nvSpPr>
+        <p:spPr/>
+        <p:txBody>
+          <a:bodyPr/>
+          <a:lstStyle/>
+          <a:p>
+            <a:r>
+              <a:rPr lang="en-US" dirty="0"/>
+              <a:t>O</a:t>
+            </a:r>
+            <a:r>
+              <a:rPr lang="en-TW" dirty="0"/>
+              <a:t>ne dimensional supproblem</a:t>
+            </a:r>
+          </a:p>
+        </p:txBody>
+      </p:sp>
+      <p:pic>
+        <p:nvPicPr>
+          <p:cNvPr id="4" name="Content Placeholder 3">
+            <a:extLst>
+              <a:ext uri="{FF2B5EF4-FFF2-40B4-BE49-F238E27FC236}">
+                <a16:creationId xmlns:a16="http://schemas.microsoft.com/office/drawing/2014/main" id="{A28FD530-1D4B-EEA3-316B-6FD02F7C0181}"/>
+              </a:ext>
+            </a:extLst>
+          </p:cNvPr>
+          <p:cNvPicPr>
+            <a:picLocks noGrp="1" noChangeAspect="1"/>
+          </p:cNvPicPr>
+          <p:nvPr>
+            <p:ph idx="1"/>
+          </p:nvPr>
+        </p:nvPicPr>
+        <p:blipFill>
+          <a:blip r:embed="rId2"/>
+          <a:stretch>
+            <a:fillRect/>
+          </a:stretch>
+        </p:blipFill>
+        <p:spPr>
+          <a:xfrm>
+            <a:off x="1944698" y="1620880"/>
+            <a:ext cx="8302604" cy="1255754"/>
+          </a:xfrm>
+          <a:prstGeom prst="rect">
+            <a:avLst/>
+          </a:prstGeom>
+        </p:spPr>
+      </p:pic>
+      <p:pic>
+        <p:nvPicPr>
+          <p:cNvPr id="3" name="Picture 2">
+            <a:extLst>
+              <a:ext uri="{FF2B5EF4-FFF2-40B4-BE49-F238E27FC236}">
+                <a16:creationId xmlns:a16="http://schemas.microsoft.com/office/drawing/2014/main" id="{216AF254-4279-2783-5970-15A7D6251B86}"/>
+              </a:ext>
+            </a:extLst>
+          </p:cNvPr>
+          <p:cNvPicPr>
+            <a:picLocks noChangeAspect="1"/>
+          </p:cNvPicPr>
+          <p:nvPr/>
+        </p:nvPicPr>
+        <p:blipFill>
+          <a:blip r:embed="rId3"/>
+          <a:stretch>
+            <a:fillRect/>
+          </a:stretch>
+        </p:blipFill>
+        <p:spPr>
+          <a:xfrm>
+            <a:off x="2209800" y="2946443"/>
+            <a:ext cx="7772400" cy="3385084"/>
+          </a:xfrm>
+          <a:prstGeom prst="rect">
+            <a:avLst/>
+          </a:prstGeom>
+        </p:spPr>
+      </p:pic>
+    </p:spTree>
+    <p:extLst>
+      <p:ext uri="{BB962C8B-B14F-4D97-AF65-F5344CB8AC3E}">
+        <p14:creationId xmlns:p14="http://schemas.microsoft.com/office/powerpoint/2010/main" val="455610"/>
+      </p:ext>
+    </p:extLst>
+  </p:cSld>
+  <p:clrMapOvr>
+    <a:masterClrMapping/>
+  </p:clrMapOvr>
+</p:sld>
+</file>
+
+<file path=ppt/slides/slide7.xml><?xml version="1.0" encoding="utf-8"?>
+<p:sld xmlns:a="http://schemas.openxmlformats.org/drawingml/2006/main" xmlns:r="http://schemas.openxmlformats.org/officeDocument/2006/relationships" xmlns:p="http://schemas.openxmlformats.org/presentationml/2006/main">
+  <p:cSld>
+    <p:spTree>
+      <p:nvGrpSpPr>
+        <p:cNvPr id="1" name=""/>
+        <p:cNvGrpSpPr/>
+        <p:nvPr/>
+      </p:nvGrpSpPr>
+      <p:grpSpPr>
+        <a:xfrm>
+          <a:off x="0" y="0"/>
+          <a:ext cx="0" cy="0"/>
+          <a:chOff x="0" y="0"/>
+          <a:chExt cx="0" cy="0"/>
+        </a:xfrm>
+      </p:grpSpPr>
+      <p:sp>
+        <p:nvSpPr>
+          <p:cNvPr id="2" name="Title 1">
+            <a:extLst>
+              <a:ext uri="{FF2B5EF4-FFF2-40B4-BE49-F238E27FC236}">
+                <a16:creationId xmlns:a16="http://schemas.microsoft.com/office/drawing/2014/main" id="{4205580D-123E-3289-9B53-1FB020EB970C}"/>
+              </a:ext>
+            </a:extLst>
+          </p:cNvPr>
+          <p:cNvSpPr>
+            <a:spLocks noGrp="1"/>
+          </p:cNvSpPr>
+          <p:nvPr>
+            <p:ph type="title"/>
+          </p:nvPr>
+        </p:nvSpPr>
+        <p:spPr/>
+        <p:txBody>
+          <a:bodyPr/>
+          <a:lstStyle/>
+          <a:p>
+            <a:endParaRPr lang="en-TW"/>
+          </a:p>
+        </p:txBody>
+      </p:sp>
+      <p:pic>
+        <p:nvPicPr>
+          <p:cNvPr id="4" name="Content Placeholder 3">
+            <a:extLst>
+              <a:ext uri="{FF2B5EF4-FFF2-40B4-BE49-F238E27FC236}">
+                <a16:creationId xmlns:a16="http://schemas.microsoft.com/office/drawing/2014/main" id="{D3BBB386-51C0-6CD3-6347-74CD774BF44A}"/>
+              </a:ext>
+            </a:extLst>
+          </p:cNvPr>
+          <p:cNvPicPr>
+            <a:picLocks noGrp="1" noChangeAspect="1"/>
+          </p:cNvPicPr>
+          <p:nvPr>
+            <p:ph idx="1"/>
+          </p:nvPr>
+        </p:nvPicPr>
+        <p:blipFill>
+          <a:blip r:embed="rId2"/>
+          <a:stretch>
+            <a:fillRect/>
+          </a:stretch>
+        </p:blipFill>
+        <p:spPr>
+          <a:xfrm>
+            <a:off x="1904245" y="516113"/>
+            <a:ext cx="8383509" cy="5410553"/>
+          </a:xfrm>
+          <a:prstGeom prst="rect">
+            <a:avLst/>
+          </a:prstGeom>
+        </p:spPr>
+      </p:pic>
+      <p:pic>
+        <p:nvPicPr>
+          <p:cNvPr id="5" name="Picture 4">
+            <a:extLst>
+              <a:ext uri="{FF2B5EF4-FFF2-40B4-BE49-F238E27FC236}">
+                <a16:creationId xmlns:a16="http://schemas.microsoft.com/office/drawing/2014/main" id="{9DEB9D02-9C86-8E79-9D05-2614A92DA4ED}"/>
+              </a:ext>
+            </a:extLst>
+          </p:cNvPr>
+          <p:cNvPicPr>
+            <a:picLocks noChangeAspect="1"/>
+          </p:cNvPicPr>
+          <p:nvPr/>
+        </p:nvPicPr>
+        <p:blipFill>
+          <a:blip r:embed="rId3"/>
+          <a:stretch>
+            <a:fillRect/>
+          </a:stretch>
+        </p:blipFill>
+        <p:spPr>
+          <a:xfrm>
+            <a:off x="7913888" y="1841676"/>
+            <a:ext cx="3886577" cy="658931"/>
+          </a:xfrm>
+          <a:prstGeom prst="rect">
+            <a:avLst/>
+          </a:prstGeom>
+        </p:spPr>
+      </p:pic>
+    </p:spTree>
+    <p:extLst>
+      <p:ext uri="{BB962C8B-B14F-4D97-AF65-F5344CB8AC3E}">
+        <p14:creationId xmlns:p14="http://schemas.microsoft.com/office/powerpoint/2010/main" val="1271712005"/>
+      </p:ext>
+    </p:extLst>
+  </p:cSld>
+  <p:clrMapOvr>
+    <a:masterClrMapping/>
+  </p:clrMapOvr>
+</p:sld>
+</file>
+
+<file path=ppt/slides/slide8.xml><?xml version="1.0" encoding="utf-8"?>
+<p:sld xmlns:a="http://schemas.openxmlformats.org/drawingml/2006/main" xmlns:r="http://schemas.openxmlformats.org/officeDocument/2006/relationships" xmlns:p="http://schemas.openxmlformats.org/presentationml/2006/main">
+  <p:cSld>
+    <p:spTree>
+      <p:nvGrpSpPr>
+        <p:cNvPr id="1" name=""/>
+        <p:cNvGrpSpPr/>
+        <p:nvPr/>
+      </p:nvGrpSpPr>
+      <p:grpSpPr>
+        <a:xfrm>
+          <a:off x="0" y="0"/>
+          <a:ext cx="0" cy="0"/>
+          <a:chOff x="0" y="0"/>
+          <a:chExt cx="0" cy="0"/>
+        </a:xfrm>
+      </p:grpSpPr>
+      <p:sp>
+        <p:nvSpPr>
+          <p:cNvPr id="2" name="Title 1">
+            <a:extLst>
+              <a:ext uri="{FF2B5EF4-FFF2-40B4-BE49-F238E27FC236}">
+                <a16:creationId xmlns:a16="http://schemas.microsoft.com/office/drawing/2014/main" id="{C189EA61-23B5-FD03-965A-DD5FF6A1804A}"/>
+              </a:ext>
+            </a:extLst>
+          </p:cNvPr>
+          <p:cNvSpPr>
+            <a:spLocks noGrp="1"/>
+          </p:cNvSpPr>
+          <p:nvPr>
+            <p:ph type="title"/>
+          </p:nvPr>
+        </p:nvSpPr>
+        <p:spPr/>
+        <p:txBody>
+          <a:bodyPr/>
+          <a:lstStyle/>
+          <a:p>
+            <a:endParaRPr lang="en-TW"/>
+          </a:p>
+        </p:txBody>
+      </p:sp>
+      <p:pic>
+        <p:nvPicPr>
+          <p:cNvPr id="9" name="Content Placeholder 8" descr="A graph of a graph with a curved line&#10;&#10;AI-generated content may be incorrect.">
+            <a:extLst>
+              <a:ext uri="{FF2B5EF4-FFF2-40B4-BE49-F238E27FC236}">
+                <a16:creationId xmlns:a16="http://schemas.microsoft.com/office/drawing/2014/main" id="{B9178CE2-56D5-23DA-966D-E13C249F1CDF}"/>
+              </a:ext>
+            </a:extLst>
+          </p:cNvPr>
+          <p:cNvPicPr>
+            <a:picLocks noGrp="1" noChangeAspect="1"/>
+          </p:cNvPicPr>
+          <p:nvPr>
+            <p:ph idx="1"/>
+          </p:nvPr>
+        </p:nvPicPr>
+        <p:blipFill>
+          <a:blip r:embed="rId2"/>
+          <a:stretch>
+            <a:fillRect/>
+          </a:stretch>
+        </p:blipFill>
+        <p:spPr>
+          <a:xfrm>
+            <a:off x="2371018" y="753665"/>
+            <a:ext cx="7134226" cy="5350670"/>
+          </a:xfrm>
+        </p:spPr>
+      </p:pic>
+    </p:spTree>
+    <p:extLst>
+      <p:ext uri="{BB962C8B-B14F-4D97-AF65-F5344CB8AC3E}">
+        <p14:creationId xmlns:p14="http://schemas.microsoft.com/office/powerpoint/2010/main" val="1910528227"/>
+      </p:ext>
+    </p:extLst>
+  </p:cSld>
+  <p:clrMapOvr>
+    <a:masterClrMapping/>
+  </p:clrMapOvr>
+</p:sld>
+</file>
+
+<file path=ppt/slides/slide9.xml><?xml version="1.0" encoding="utf-8"?>
+<p:sld xmlns:a="http://schemas.openxmlformats.org/drawingml/2006/main" xmlns:r="http://schemas.openxmlformats.org/officeDocument/2006/relationships" xmlns:p="http://schemas.openxmlformats.org/presentationml/2006/main">
+  <p:cSld>
+    <p:spTree>
+      <p:nvGrpSpPr>
+        <p:cNvPr id="1" name=""/>
+        <p:cNvGrpSpPr/>
+        <p:nvPr/>
+      </p:nvGrpSpPr>
+      <p:grpSpPr>
+        <a:xfrm>
+          <a:off x="0" y="0"/>
+          <a:ext cx="0" cy="0"/>
+          <a:chOff x="0" y="0"/>
+          <a:chExt cx="0" cy="0"/>
+        </a:xfrm>
+      </p:grpSpPr>
+      <p:sp>
+        <p:nvSpPr>
+          <p:cNvPr id="2" name="Title 1">
+            <a:extLst>
+              <a:ext uri="{FF2B5EF4-FFF2-40B4-BE49-F238E27FC236}">
+                <a16:creationId xmlns:a16="http://schemas.microsoft.com/office/drawing/2014/main" id="{63633825-A9C8-A5B6-D136-F242D25539A3}"/>
+              </a:ext>
+            </a:extLst>
+          </p:cNvPr>
+          <p:cNvSpPr>
+            <a:spLocks noGrp="1"/>
+          </p:cNvSpPr>
+          <p:nvPr>
+            <p:ph type="title"/>
+          </p:nvPr>
+        </p:nvSpPr>
+        <p:spPr/>
+        <p:txBody>
+          <a:bodyPr/>
+          <a:lstStyle/>
+          <a:p>
+            <a:endParaRPr lang="en-TW"/>
+          </a:p>
+        </p:txBody>
+      </p:sp>
+      <p:pic>
+        <p:nvPicPr>
+          <p:cNvPr id="5" name="Content Placeholder 4" descr="A graph of a surface&#10;&#10;AI-generated content may be incorrect.">
+            <a:extLst>
+              <a:ext uri="{FF2B5EF4-FFF2-40B4-BE49-F238E27FC236}">
+                <a16:creationId xmlns:a16="http://schemas.microsoft.com/office/drawing/2014/main" id="{C78C2846-E3AE-4CDC-1E2A-0C0AF6811B95}"/>
+              </a:ext>
+            </a:extLst>
+          </p:cNvPr>
+          <p:cNvPicPr>
+            <a:picLocks noGrp="1" noChangeAspect="1"/>
+          </p:cNvPicPr>
+          <p:nvPr>
+            <p:ph idx="1"/>
+          </p:nvPr>
+        </p:nvPicPr>
+        <p:blipFill>
+          <a:blip r:embed="rId2"/>
+          <a:stretch>
+            <a:fillRect/>
+          </a:stretch>
+        </p:blipFill>
+        <p:spPr>
+          <a:xfrm>
+            <a:off x="2075215" y="466725"/>
+            <a:ext cx="3840000" cy="2880000"/>
+          </a:xfrm>
+        </p:spPr>
+      </p:pic>
+      <p:pic>
+        <p:nvPicPr>
+          <p:cNvPr id="7" name="Picture 6" descr="A graph of a surface and subgradient path&#10;&#10;AI-generated content may be incorrect.">
+            <a:extLst>
+              <a:ext uri="{FF2B5EF4-FFF2-40B4-BE49-F238E27FC236}">
+                <a16:creationId xmlns:a16="http://schemas.microsoft.com/office/drawing/2014/main" id="{72AE346A-262F-993F-1C4B-4437081D56DC}"/>
+              </a:ext>
+            </a:extLst>
+          </p:cNvPr>
+          <p:cNvPicPr>
+            <a:picLocks noChangeAspect="1"/>
+          </p:cNvPicPr>
+          <p:nvPr/>
+        </p:nvPicPr>
+        <p:blipFill>
+          <a:blip r:embed="rId3"/>
+          <a:stretch>
+            <a:fillRect/>
+          </a:stretch>
+        </p:blipFill>
+        <p:spPr>
+          <a:xfrm>
+            <a:off x="5915215" y="3322589"/>
+            <a:ext cx="3840000" cy="2880000"/>
+          </a:xfrm>
+          <a:prstGeom prst="rect">
+            <a:avLst/>
+          </a:prstGeom>
+        </p:spPr>
+      </p:pic>
+      <p:pic>
+        <p:nvPicPr>
+          <p:cNvPr id="9" name="Picture 8" descr="A graph of a surface with a curved curve&#10;&#10;AI-generated content may be incorrect.">
+            <a:extLst>
+              <a:ext uri="{FF2B5EF4-FFF2-40B4-BE49-F238E27FC236}">
+                <a16:creationId xmlns:a16="http://schemas.microsoft.com/office/drawing/2014/main" id="{925B4C77-E402-CCA0-F0FE-D917F82006A4}"/>
+              </a:ext>
+            </a:extLst>
+          </p:cNvPr>
+          <p:cNvPicPr>
+            <a:picLocks noChangeAspect="1"/>
+          </p:cNvPicPr>
+          <p:nvPr/>
+        </p:nvPicPr>
+        <p:blipFill>
+          <a:blip r:embed="rId4"/>
+          <a:stretch>
+            <a:fillRect/>
+          </a:stretch>
+        </p:blipFill>
+        <p:spPr>
+          <a:xfrm>
+            <a:off x="5915215" y="466725"/>
+            <a:ext cx="3840000" cy="2880000"/>
+          </a:xfrm>
+          <a:prstGeom prst="rect">
+            <a:avLst/>
+          </a:prstGeom>
+        </p:spPr>
+      </p:pic>
+      <p:pic>
+        <p:nvPicPr>
+          <p:cNvPr id="11" name="Picture 10" descr="A graph of a function&#10;&#10;AI-generated content may be incorrect.">
+            <a:extLst>
+              <a:ext uri="{FF2B5EF4-FFF2-40B4-BE49-F238E27FC236}">
+                <a16:creationId xmlns:a16="http://schemas.microsoft.com/office/drawing/2014/main" id="{FBA1733B-7086-39E0-EA1C-0EFBF20F5606}"/>
+              </a:ext>
+            </a:extLst>
+          </p:cNvPr>
+          <p:cNvPicPr>
+            <a:picLocks noChangeAspect="1"/>
+          </p:cNvPicPr>
+          <p:nvPr/>
+        </p:nvPicPr>
+        <p:blipFill>
+          <a:blip r:embed="rId5"/>
+          <a:stretch>
+            <a:fillRect/>
+          </a:stretch>
+        </p:blipFill>
+        <p:spPr>
+          <a:xfrm>
+            <a:off x="2075215" y="3322589"/>
+            <a:ext cx="3840000" cy="2880000"/>
+          </a:xfrm>
+          <a:prstGeom prst="rect">
+            <a:avLst/>
+          </a:prstGeom>
+        </p:spPr>
+      </p:pic>
+    </p:spTree>
+    <p:extLst>
+      <p:ext uri="{BB962C8B-B14F-4D97-AF65-F5344CB8AC3E}">
+        <p14:creationId xmlns:p14="http://schemas.microsoft.com/office/powerpoint/2010/main" val="1239079381"/>
       </p:ext>
     </p:extLst>
   </p:cSld>
@@ -5926,4 +7596,319 @@
     </a:ext>
   </a:extLst>
 </a:theme>
+</file>
+
+<file path=ppt/theme/theme2.xml><?xml version="1.0" encoding="utf-8"?>
+<a:theme xmlns:a="http://schemas.openxmlformats.org/drawingml/2006/main" name="Office 佈景主題">
+  <a:themeElements>
+    <a:clrScheme name="Office">
+      <a:dk1>
+        <a:sysClr val="windowText" lastClr="000000"/>
+      </a:dk1>
+      <a:lt1>
+        <a:sysClr val="window" lastClr="FFFFFF"/>
+      </a:lt1>
+      <a:dk2>
+        <a:srgbClr val="0E2841"/>
+      </a:dk2>
+      <a:lt2>
+        <a:srgbClr val="E8E8E8"/>
+      </a:lt2>
+      <a:accent1>
+        <a:srgbClr val="156082"/>
+      </a:accent1>
+      <a:accent2>
+        <a:srgbClr val="E97132"/>
+      </a:accent2>
+      <a:accent3>
+        <a:srgbClr val="196B24"/>
+      </a:accent3>
+      <a:accent4>
+        <a:srgbClr val="0F9ED5"/>
+      </a:accent4>
+      <a:accent5>
+        <a:srgbClr val="A02B93"/>
+      </a:accent5>
+      <a:accent6>
+        <a:srgbClr val="4EA72E"/>
+      </a:accent6>
+      <a:hlink>
+        <a:srgbClr val="467886"/>
+      </a:hlink>
+      <a:folHlink>
+        <a:srgbClr val="96607D"/>
+      </a:folHlink>
+    </a:clrScheme>
+    <a:fontScheme name="Office">
+      <a:majorFont>
+        <a:latin typeface="Aptos Display" panose="02110004020202020204"/>
+        <a:ea typeface=""/>
+        <a:cs typeface=""/>
+        <a:font script="Jpan" typeface="游ゴシック Light"/>
+        <a:font script="Hang" typeface="맑은 고딕"/>
+        <a:font script="Hans" typeface="等线 Light"/>
+        <a:font script="Hant" typeface="新細明體"/>
+        <a:font script="Arab" typeface="Times New Roman"/>
+        <a:font script="Hebr" typeface="Times New Roman"/>
+        <a:font script="Thai" typeface="Angsana New"/>
+        <a:font script="Ethi" typeface="Nyala"/>
+        <a:font script="Beng" typeface="Vrinda"/>
+        <a:font script="Gujr" typeface="Shruti"/>
+        <a:font script="Khmr" typeface="MoolBoran"/>
+        <a:font script="Knda" typeface="Tunga"/>
+        <a:font script="Guru" typeface="Raavi"/>
+        <a:font script="Cans" typeface="Euphemia"/>
+        <a:font script="Cher" typeface="Plantagenet Cherokee"/>
+        <a:font script="Yiii" typeface="Microsoft Yi Baiti"/>
+        <a:font script="Tibt" typeface="Microsoft Himalaya"/>
+        <a:font script="Thaa" typeface="MV Boli"/>
+        <a:font script="Deva" typeface="Mangal"/>
+        <a:font script="Telu" typeface="Gautami"/>
+        <a:font script="Taml" typeface="Latha"/>
+        <a:font script="Syrc" typeface="Estrangelo Edessa"/>
+        <a:font script="Orya" typeface="Kalinga"/>
+        <a:font script="Mlym" typeface="Kartika"/>
+        <a:font script="Laoo" typeface="DokChampa"/>
+        <a:font script="Sinh" typeface="Iskoola Pota"/>
+        <a:font script="Mong" typeface="Mongolian Baiti"/>
+        <a:font script="Viet" typeface="Times New Roman"/>
+        <a:font script="Uigh" typeface="Microsoft Uighur"/>
+        <a:font script="Geor" typeface="Sylfaen"/>
+        <a:font script="Armn" typeface="Arial"/>
+        <a:font script="Bugi" typeface="Leelawadee UI"/>
+        <a:font script="Bopo" typeface="Microsoft JhengHei"/>
+        <a:font script="Java" typeface="Javanese Text"/>
+        <a:font script="Lisu" typeface="Segoe UI"/>
+        <a:font script="Mymr" typeface="Myanmar Text"/>
+        <a:font script="Nkoo" typeface="Ebrima"/>
+        <a:font script="Olck" typeface="Nirmala UI"/>
+        <a:font script="Osma" typeface="Ebrima"/>
+        <a:font script="Phag" typeface="Phagspa"/>
+        <a:font script="Syrn" typeface="Estrangelo Edessa"/>
+        <a:font script="Syrj" typeface="Estrangelo Edessa"/>
+        <a:font script="Syre" typeface="Estrangelo Edessa"/>
+        <a:font script="Sora" typeface="Nirmala UI"/>
+        <a:font script="Tale" typeface="Microsoft Tai Le"/>
+        <a:font script="Talu" typeface="Microsoft New Tai Lue"/>
+        <a:font script="Tfng" typeface="Ebrima"/>
+      </a:majorFont>
+      <a:minorFont>
+        <a:latin typeface="Aptos" panose="02110004020202020204"/>
+        <a:ea typeface=""/>
+        <a:cs typeface=""/>
+        <a:font script="Jpan" typeface="游ゴシック"/>
+        <a:font script="Hang" typeface="맑은 고딕"/>
+        <a:font script="Hans" typeface="等线"/>
+        <a:font script="Hant" typeface="新細明體"/>
+        <a:font script="Arab" typeface="Arial"/>
+        <a:font script="Hebr" typeface="Arial"/>
+        <a:font script="Thai" typeface="Cordia New"/>
+        <a:font script="Ethi" typeface="Nyala"/>
+        <a:font script="Beng" typeface="Vrinda"/>
+        <a:font script="Gujr" typeface="Shruti"/>
+        <a:font script="Khmr" typeface="DaunPenh"/>
+        <a:font script="Knda" typeface="Tunga"/>
+        <a:font script="Guru" typeface="Raavi"/>
+        <a:font script="Cans" typeface="Euphemia"/>
+        <a:font script="Cher" typeface="Plantagenet Cherokee"/>
+        <a:font script="Yiii" typeface="Microsoft Yi Baiti"/>
+        <a:font script="Tibt" typeface="Microsoft Himalaya"/>
+        <a:font script="Thaa" typeface="MV Boli"/>
+        <a:font script="Deva" typeface="Mangal"/>
+        <a:font script="Telu" typeface="Gautami"/>
+        <a:font script="Taml" typeface="Latha"/>
+        <a:font script="Syrc" typeface="Estrangelo Edessa"/>
+        <a:font script="Orya" typeface="Kalinga"/>
+        <a:font script="Mlym" typeface="Kartika"/>
+        <a:font script="Laoo" typeface="DokChampa"/>
+        <a:font script="Sinh" typeface="Iskoola Pota"/>
+        <a:font script="Mong" typeface="Mongolian Baiti"/>
+        <a:font script="Viet" typeface="Arial"/>
+        <a:font script="Uigh" typeface="Microsoft Uighur"/>
+        <a:font script="Geor" typeface="Sylfaen"/>
+        <a:font script="Armn" typeface="Arial"/>
+        <a:font script="Bugi" typeface="Leelawadee UI"/>
+        <a:font script="Bopo" typeface="Microsoft JhengHei"/>
+        <a:font script="Java" typeface="Javanese Text"/>
+        <a:font script="Lisu" typeface="Segoe UI"/>
+        <a:font script="Mymr" typeface="Myanmar Text"/>
+        <a:font script="Nkoo" typeface="Ebrima"/>
+        <a:font script="Olck" typeface="Nirmala UI"/>
+        <a:font script="Osma" typeface="Ebrima"/>
+        <a:font script="Phag" typeface="Phagspa"/>
+        <a:font script="Syrn" typeface="Estrangelo Edessa"/>
+        <a:font script="Syrj" typeface="Estrangelo Edessa"/>
+        <a:font script="Syre" typeface="Estrangelo Edessa"/>
+        <a:font script="Sora" typeface="Nirmala UI"/>
+        <a:font script="Tale" typeface="Microsoft Tai Le"/>
+        <a:font script="Talu" typeface="Microsoft New Tai Lue"/>
+        <a:font script="Tfng" typeface="Ebrima"/>
+      </a:minorFont>
+    </a:fontScheme>
+    <a:fmtScheme name="Office">
+      <a:fillStyleLst>
+        <a:solidFill>
+          <a:schemeClr val="phClr"/>
+        </a:solidFill>
+        <a:gradFill rotWithShape="1">
+          <a:gsLst>
+            <a:gs pos="0">
+              <a:schemeClr val="phClr">
+                <a:lumMod val="110000"/>
+                <a:satMod val="105000"/>
+                <a:tint val="67000"/>
+              </a:schemeClr>
+            </a:gs>
+            <a:gs pos="50000">
+              <a:schemeClr val="phClr">
+                <a:lumMod val="105000"/>
+                <a:satMod val="103000"/>
+                <a:tint val="73000"/>
+              </a:schemeClr>
+            </a:gs>
+            <a:gs pos="100000">
+              <a:schemeClr val="phClr">
+                <a:lumMod val="105000"/>
+                <a:satMod val="109000"/>
+                <a:tint val="81000"/>
+              </a:schemeClr>
+            </a:gs>
+          </a:gsLst>
+          <a:lin ang="5400000" scaled="0"/>
+        </a:gradFill>
+        <a:gradFill rotWithShape="1">
+          <a:gsLst>
+            <a:gs pos="0">
+              <a:schemeClr val="phClr">
+                <a:satMod val="103000"/>
+                <a:lumMod val="102000"/>
+                <a:tint val="94000"/>
+              </a:schemeClr>
+            </a:gs>
+            <a:gs pos="50000">
+              <a:schemeClr val="phClr">
+                <a:satMod val="110000"/>
+                <a:lumMod val="100000"/>
+                <a:shade val="100000"/>
+              </a:schemeClr>
+            </a:gs>
+            <a:gs pos="100000">
+              <a:schemeClr val="phClr">
+                <a:lumMod val="99000"/>
+                <a:satMod val="120000"/>
+                <a:shade val="78000"/>
+              </a:schemeClr>
+            </a:gs>
+          </a:gsLst>
+          <a:lin ang="5400000" scaled="0"/>
+        </a:gradFill>
+      </a:fillStyleLst>
+      <a:lnStyleLst>
+        <a:ln w="12700" cap="flat" cmpd="sng" algn="ctr">
+          <a:solidFill>
+            <a:schemeClr val="phClr"/>
+          </a:solidFill>
+          <a:prstDash val="solid"/>
+          <a:miter lim="800000"/>
+        </a:ln>
+        <a:ln w="19050" cap="flat" cmpd="sng" algn="ctr">
+          <a:solidFill>
+            <a:schemeClr val="phClr"/>
+          </a:solidFill>
+          <a:prstDash val="solid"/>
+          <a:miter lim="800000"/>
+        </a:ln>
+        <a:ln w="25400" cap="flat" cmpd="sng" algn="ctr">
+          <a:solidFill>
+            <a:schemeClr val="phClr"/>
+          </a:solidFill>
+          <a:prstDash val="solid"/>
+          <a:miter lim="800000"/>
+        </a:ln>
+      </a:lnStyleLst>
+      <a:effectStyleLst>
+        <a:effectStyle>
+          <a:effectLst/>
+        </a:effectStyle>
+        <a:effectStyle>
+          <a:effectLst/>
+        </a:effectStyle>
+        <a:effectStyle>
+          <a:effectLst>
+            <a:outerShdw blurRad="57150" dist="19050" dir="5400000" algn="ctr" rotWithShape="0">
+              <a:srgbClr val="000000">
+                <a:alpha val="63000"/>
+              </a:srgbClr>
+            </a:outerShdw>
+          </a:effectLst>
+        </a:effectStyle>
+      </a:effectStyleLst>
+      <a:bgFillStyleLst>
+        <a:solidFill>
+          <a:schemeClr val="phClr"/>
+        </a:solidFill>
+        <a:solidFill>
+          <a:schemeClr val="phClr">
+            <a:tint val="95000"/>
+            <a:satMod val="170000"/>
+          </a:schemeClr>
+        </a:solidFill>
+        <a:gradFill rotWithShape="1">
+          <a:gsLst>
+            <a:gs pos="0">
+              <a:schemeClr val="phClr">
+                <a:tint val="93000"/>
+                <a:satMod val="150000"/>
+                <a:shade val="98000"/>
+                <a:lumMod val="102000"/>
+              </a:schemeClr>
+            </a:gs>
+            <a:gs pos="50000">
+              <a:schemeClr val="phClr">
+                <a:tint val="98000"/>
+                <a:satMod val="130000"/>
+                <a:shade val="90000"/>
+                <a:lumMod val="103000"/>
+              </a:schemeClr>
+            </a:gs>
+            <a:gs pos="100000">
+              <a:schemeClr val="phClr">
+                <a:shade val="63000"/>
+                <a:satMod val="120000"/>
+              </a:schemeClr>
+            </a:gs>
+          </a:gsLst>
+          <a:lin ang="5400000" scaled="0"/>
+        </a:gradFill>
+      </a:bgFillStyleLst>
+    </a:fmtScheme>
+  </a:themeElements>
+  <a:objectDefaults>
+    <a:lnDef>
+      <a:spPr/>
+      <a:bodyPr/>
+      <a:lstStyle/>
+      <a:style>
+        <a:lnRef idx="2">
+          <a:schemeClr val="accent1"/>
+        </a:lnRef>
+        <a:fillRef idx="0">
+          <a:schemeClr val="accent1"/>
+        </a:fillRef>
+        <a:effectRef idx="1">
+          <a:schemeClr val="accent1"/>
+        </a:effectRef>
+        <a:fontRef idx="minor">
+          <a:schemeClr val="tx1"/>
+        </a:fontRef>
+      </a:style>
+    </a:lnDef>
+  </a:objectDefaults>
+  <a:extraClrSchemeLst/>
+  <a:extLst>
+    <a:ext uri="{05A4C25C-085E-4340-85A3-A5531E510DB2}">
+      <thm15:themeFamily xmlns:thm15="http://schemas.microsoft.com/office/thememl/2012/main" name="Office Theme" id="{2E142A2C-CD16-42D6-873A-C26D2A0506FA}" vid="{1BDDFF52-6CD6-40A5-AB3C-68EB2F1E4D0A}"/>
+    </a:ext>
+  </a:extLst>
+</a:theme>
 </file>
</xml_diff>

<commit_message>
Update Lasso presentation slides and remove temporary backup file
</commit_message>
<xml_diff>
--- a/LassoSlides.pptx
+++ b/LassoSlides.pptx
@@ -4030,13 +4030,8 @@
           <a:p>
             <a:r>
               <a:rPr lang="en-TW" dirty="0"/>
-              <a:t>特徵高相關性時，只會取一個</a:t>
-            </a:r>
-            <a:r>
-              <a:rPr lang="en-TW"/>
-              <a:t>，其他砍成0</a:t>
-            </a:r>
-            <a:endParaRPr lang="en-TW" dirty="0"/>
+              <a:t>特徵高相關性時，只會取一個，其他砍成0</a:t>
+            </a:r>
           </a:p>
         </p:txBody>
       </p:sp>

</xml_diff>